<commit_message>
add model construction claim
Signed-off-by: Nikolaj Bjorner <nbjorner@microsoft.com>
</commit_message>
<xml_diff>
--- a/slides/guest-lectures-wien-2025/lecture3-theories.pptx
+++ b/slides/guest-lectures-wien-2025/lecture3-theories.pptx
@@ -5,7 +5,7 @@
     <p:sldMasterId id="2147483648" r:id="rId4"/>
   </p:sldMasterIdLst>
   <p:notesMasterIdLst>
-    <p:notesMasterId r:id="rId45"/>
+    <p:notesMasterId r:id="rId46"/>
   </p:notesMasterIdLst>
   <p:sldIdLst>
     <p:sldId id="256" r:id="rId5"/>
@@ -42,12 +42,13 @@
     <p:sldId id="2146847262" r:id="rId36"/>
     <p:sldId id="2146847261" r:id="rId37"/>
     <p:sldId id="2146847256" r:id="rId38"/>
-    <p:sldId id="2146847257" r:id="rId39"/>
-    <p:sldId id="2146847263" r:id="rId40"/>
-    <p:sldId id="2146847258" r:id="rId41"/>
-    <p:sldId id="2146847255" r:id="rId42"/>
-    <p:sldId id="2146847259" r:id="rId43"/>
-    <p:sldId id="2146847260" r:id="rId44"/>
+    <p:sldId id="2146847264" r:id="rId39"/>
+    <p:sldId id="2146847257" r:id="rId40"/>
+    <p:sldId id="2146847263" r:id="rId41"/>
+    <p:sldId id="2146847258" r:id="rId42"/>
+    <p:sldId id="2146847255" r:id="rId43"/>
+    <p:sldId id="2146847259" r:id="rId44"/>
+    <p:sldId id="2146847260" r:id="rId45"/>
   </p:sldIdLst>
   <p:sldSz cx="12192000" cy="6858000"/>
   <p:notesSz cx="6858000" cy="9144000"/>
@@ -3140,7 +3141,7 @@
           <a:p>
             <a:fld id="{E0060B70-99F6-46DC-AC28-61E24B2D140B}" type="datetimeFigureOut">
               <a:rPr lang="en-US" smtClean="0"/>
-              <a:t>10/14/2025</a:t>
+              <a:t>10/15/2025</a:t>
             </a:fld>
             <a:endParaRPr lang="en-US"/>
           </a:p>
@@ -3661,7 +3662,7 @@
                 <a:tabLst/>
                 <a:defRPr/>
               </a:pPr>
-              <a:t>10/14/2025 6:59 PM</a:t>
+              <a:t>10/15/2025 6:13 PM</a:t>
             </a:fld>
             <a:endParaRPr kumimoji="0" lang="en-US" sz="1200" b="0" i="0" u="none" strike="noStrike" kern="1200" cap="none" spc="0" normalizeH="0" baseline="0" noProof="0">
               <a:ln>
@@ -4085,7 +4086,7 @@
           <a:p>
             <a:fld id="{D71F6AB6-6FBF-4B63-A5C3-90DEBBF6936C}" type="datetimeFigureOut">
               <a:rPr lang="en-US" smtClean="0"/>
-              <a:t>10/14/2025</a:t>
+              <a:t>10/15/2025</a:t>
             </a:fld>
             <a:endParaRPr lang="en-US"/>
           </a:p>
@@ -4283,7 +4284,7 @@
           <a:p>
             <a:fld id="{D71F6AB6-6FBF-4B63-A5C3-90DEBBF6936C}" type="datetimeFigureOut">
               <a:rPr lang="en-US" smtClean="0"/>
-              <a:t>10/14/2025</a:t>
+              <a:t>10/15/2025</a:t>
             </a:fld>
             <a:endParaRPr lang="en-US"/>
           </a:p>
@@ -4491,7 +4492,7 @@
           <a:p>
             <a:fld id="{D71F6AB6-6FBF-4B63-A5C3-90DEBBF6936C}" type="datetimeFigureOut">
               <a:rPr lang="en-US" smtClean="0"/>
-              <a:t>10/14/2025</a:t>
+              <a:t>10/15/2025</a:t>
             </a:fld>
             <a:endParaRPr lang="en-US"/>
           </a:p>
@@ -4689,7 +4690,7 @@
           <a:p>
             <a:fld id="{D71F6AB6-6FBF-4B63-A5C3-90DEBBF6936C}" type="datetimeFigureOut">
               <a:rPr lang="en-US" smtClean="0"/>
-              <a:t>10/14/2025</a:t>
+              <a:t>10/15/2025</a:t>
             </a:fld>
             <a:endParaRPr lang="en-US"/>
           </a:p>
@@ -4964,7 +4965,7 @@
           <a:p>
             <a:fld id="{D71F6AB6-6FBF-4B63-A5C3-90DEBBF6936C}" type="datetimeFigureOut">
               <a:rPr lang="en-US" smtClean="0"/>
-              <a:t>10/14/2025</a:t>
+              <a:t>10/15/2025</a:t>
             </a:fld>
             <a:endParaRPr lang="en-US"/>
           </a:p>
@@ -5229,7 +5230,7 @@
           <a:p>
             <a:fld id="{D71F6AB6-6FBF-4B63-A5C3-90DEBBF6936C}" type="datetimeFigureOut">
               <a:rPr lang="en-US" smtClean="0"/>
-              <a:t>10/14/2025</a:t>
+              <a:t>10/15/2025</a:t>
             </a:fld>
             <a:endParaRPr lang="en-US"/>
           </a:p>
@@ -5641,7 +5642,7 @@
           <a:p>
             <a:fld id="{D71F6AB6-6FBF-4B63-A5C3-90DEBBF6936C}" type="datetimeFigureOut">
               <a:rPr lang="en-US" smtClean="0"/>
-              <a:t>10/14/2025</a:t>
+              <a:t>10/15/2025</a:t>
             </a:fld>
             <a:endParaRPr lang="en-US"/>
           </a:p>
@@ -5782,7 +5783,7 @@
           <a:p>
             <a:fld id="{D71F6AB6-6FBF-4B63-A5C3-90DEBBF6936C}" type="datetimeFigureOut">
               <a:rPr lang="en-US" smtClean="0"/>
-              <a:t>10/14/2025</a:t>
+              <a:t>10/15/2025</a:t>
             </a:fld>
             <a:endParaRPr lang="en-US"/>
           </a:p>
@@ -5895,7 +5896,7 @@
           <a:p>
             <a:fld id="{D71F6AB6-6FBF-4B63-A5C3-90DEBBF6936C}" type="datetimeFigureOut">
               <a:rPr lang="en-US" smtClean="0"/>
-              <a:t>10/14/2025</a:t>
+              <a:t>10/15/2025</a:t>
             </a:fld>
             <a:endParaRPr lang="en-US"/>
           </a:p>
@@ -6206,7 +6207,7 @@
           <a:p>
             <a:fld id="{D71F6AB6-6FBF-4B63-A5C3-90DEBBF6936C}" type="datetimeFigureOut">
               <a:rPr lang="en-US" smtClean="0"/>
-              <a:t>10/14/2025</a:t>
+              <a:t>10/15/2025</a:t>
             </a:fld>
             <a:endParaRPr lang="en-US"/>
           </a:p>
@@ -6494,7 +6495,7 @@
           <a:p>
             <a:fld id="{D71F6AB6-6FBF-4B63-A5C3-90DEBBF6936C}" type="datetimeFigureOut">
               <a:rPr lang="en-US" smtClean="0"/>
-              <a:t>10/14/2025</a:t>
+              <a:t>10/15/2025</a:t>
             </a:fld>
             <a:endParaRPr lang="en-US"/>
           </a:p>
@@ -6735,7 +6736,7 @@
           <a:p>
             <a:fld id="{D71F6AB6-6FBF-4B63-A5C3-90DEBBF6936C}" type="datetimeFigureOut">
               <a:rPr lang="en-US" smtClean="0"/>
-              <a:t>10/14/2025</a:t>
+              <a:t>10/15/2025</a:t>
             </a:fld>
             <a:endParaRPr lang="en-US"/>
           </a:p>
@@ -26048,7 +26049,7 @@
           </a:ln>
           <a:extLst>
             <a:ext uri="{C572A759-6A51-4108-AA02-DFA0A04FC94B}">
-              <ma14:wrappingTextBoxFlag xmlns:m="http://schemas.openxmlformats.org/officeDocument/2006/math" xmlns:a14="http://schemas.microsoft.com/office/drawing/2010/main" xmlns:ma14="http://schemas.microsoft.com/office/mac/drawingml/2011/main" xmlns="" val="1"/>
+              <ma14:wrappingTextBoxFlag xmlns="" xmlns:ma14="http://schemas.microsoft.com/office/mac/drawingml/2011/main" xmlns:a14="http://schemas.microsoft.com/office/drawing/2010/main" xmlns:m="http://schemas.openxmlformats.org/officeDocument/2006/math" val="1"/>
             </a:ext>
           </a:extLst>
         </p:spPr>
@@ -27729,7 +27730,7 @@
           </a:ln>
           <a:extLst>
             <a:ext uri="{C572A759-6A51-4108-AA02-DFA0A04FC94B}">
-              <ma14:wrappingTextBoxFlag xmlns:ma14="http://schemas.microsoft.com/office/mac/drawingml/2011/main" xmlns:a14="http://schemas.microsoft.com/office/drawing/2010/main" xmlns:m="http://schemas.openxmlformats.org/officeDocument/2006/math" xmlns="" val="1"/>
+              <ma14:wrappingTextBoxFlag xmlns="" xmlns:m="http://schemas.openxmlformats.org/officeDocument/2006/math" xmlns:a14="http://schemas.microsoft.com/office/drawing/2010/main" xmlns:ma14="http://schemas.microsoft.com/office/mac/drawingml/2011/main" val="1"/>
             </a:ext>
           </a:extLst>
         </p:spPr>
@@ -29307,7 +29308,7 @@
               </a:ln>
               <a:extLst>
                 <a:ext uri="{C572A759-6A51-4108-AA02-DFA0A04FC94B}">
-                  <ma14:wrappingTextBoxFlag xmlns:m="http://schemas.openxmlformats.org/officeDocument/2006/math" xmlns:ma14="http://schemas.microsoft.com/office/mac/drawingml/2011/main" xmlns="" val="1"/>
+                  <ma14:wrappingTextBoxFlag xmlns="" xmlns:ma14="http://schemas.microsoft.com/office/mac/drawingml/2011/main" xmlns:m="http://schemas.openxmlformats.org/officeDocument/2006/math" val="1"/>
                 </a:ext>
               </a:extLst>
             </p:spPr>
@@ -29675,7 +29676,7 @@
               </a:ln>
               <a:extLst>
                 <a:ext uri="{C572A759-6A51-4108-AA02-DFA0A04FC94B}">
-                  <ma14:wrappingTextBoxFlag xmlns:ma14="http://schemas.microsoft.com/office/mac/drawingml/2011/main" xmlns:m="http://schemas.openxmlformats.org/officeDocument/2006/math" xmlns="" val="1"/>
+                  <ma14:wrappingTextBoxFlag xmlns="" xmlns:m="http://schemas.openxmlformats.org/officeDocument/2006/math" xmlns:ma14="http://schemas.microsoft.com/office/mac/drawingml/2011/main" val="1"/>
                 </a:ext>
               </a:extLst>
             </p:spPr>
@@ -30469,7 +30470,7 @@
               </a:ln>
               <a:extLst>
                 <a:ext uri="{C572A759-6A51-4108-AA02-DFA0A04FC94B}">
-                  <ma14:wrappingTextBoxFlag xmlns:m="http://schemas.openxmlformats.org/officeDocument/2006/math" xmlns:ma14="http://schemas.microsoft.com/office/mac/drawingml/2011/main" xmlns="" val="1"/>
+                  <ma14:wrappingTextBoxFlag xmlns="" xmlns:ma14="http://schemas.microsoft.com/office/mac/drawingml/2011/main" xmlns:m="http://schemas.openxmlformats.org/officeDocument/2006/math" val="1"/>
                 </a:ext>
               </a:extLst>
             </p:spPr>
@@ -31597,7 +31598,7 @@
               </a:ln>
               <a:extLst>
                 <a:ext uri="{C572A759-6A51-4108-AA02-DFA0A04FC94B}">
-                  <ma14:wrappingTextBoxFlag xmlns:ma14="http://schemas.microsoft.com/office/mac/drawingml/2011/main" xmlns:m="http://schemas.openxmlformats.org/officeDocument/2006/math" xmlns="" val="1"/>
+                  <ma14:wrappingTextBoxFlag xmlns="" xmlns:m="http://schemas.openxmlformats.org/officeDocument/2006/math" xmlns:ma14="http://schemas.microsoft.com/office/mac/drawingml/2011/main" val="1"/>
                 </a:ext>
               </a:extLst>
             </p:spPr>
@@ -31965,7 +31966,7 @@
               </a:ln>
               <a:extLst>
                 <a:ext uri="{C572A759-6A51-4108-AA02-DFA0A04FC94B}">
-                  <ma14:wrappingTextBoxFlag xmlns:m="http://schemas.openxmlformats.org/officeDocument/2006/math" xmlns:ma14="http://schemas.microsoft.com/office/mac/drawingml/2011/main" xmlns="" val="1"/>
+                  <ma14:wrappingTextBoxFlag xmlns="" xmlns:ma14="http://schemas.microsoft.com/office/mac/drawingml/2011/main" xmlns:m="http://schemas.openxmlformats.org/officeDocument/2006/math" val="1"/>
                 </a:ext>
               </a:extLst>
             </p:spPr>
@@ -38485,6 +38486,179 @@
   <p:cSld>
     <p:spTree>
       <p:nvGrpSpPr>
+        <p:cNvPr id="1" name=""/>
+        <p:cNvGrpSpPr/>
+        <p:nvPr/>
+      </p:nvGrpSpPr>
+      <p:grpSpPr>
+        <a:xfrm>
+          <a:off x="0" y="0"/>
+          <a:ext cx="0" cy="0"/>
+          <a:chOff x="0" y="0"/>
+          <a:chExt cx="0" cy="0"/>
+        </a:xfrm>
+      </p:grpSpPr>
+      <p:sp>
+        <p:nvSpPr>
+          <p:cNvPr id="2" name="Title 1">
+            <a:extLst>
+              <a:ext uri="{FF2B5EF4-FFF2-40B4-BE49-F238E27FC236}">
+                <a16:creationId xmlns:a16="http://schemas.microsoft.com/office/drawing/2014/main" id="{417BE21F-2CA8-7B83-D170-283240D8F867}"/>
+              </a:ext>
+            </a:extLst>
+          </p:cNvPr>
+          <p:cNvSpPr>
+            <a:spLocks noGrp="1"/>
+          </p:cNvSpPr>
+          <p:nvPr>
+            <p:ph type="title"/>
+          </p:nvPr>
+        </p:nvSpPr>
+        <p:spPr/>
+        <p:txBody>
+          <a:bodyPr/>
+          <a:lstStyle/>
+          <a:p>
+            <a:r>
+              <a:rPr lang="en-US" dirty="0"/>
+              <a:t>Model Construction and Saturation</a:t>
+            </a:r>
+          </a:p>
+        </p:txBody>
+      </p:sp>
+      <p:sp>
+        <p:nvSpPr>
+          <p:cNvPr id="3" name="Content Placeholder 2">
+            <a:extLst>
+              <a:ext uri="{FF2B5EF4-FFF2-40B4-BE49-F238E27FC236}">
+                <a16:creationId xmlns:a16="http://schemas.microsoft.com/office/drawing/2014/main" id="{F7359A89-C2B3-247C-C6F5-3E06C5261B4F}"/>
+              </a:ext>
+            </a:extLst>
+          </p:cNvPr>
+          <p:cNvSpPr>
+            <a:spLocks noGrp="1"/>
+          </p:cNvSpPr>
+          <p:nvPr>
+            <p:ph idx="1"/>
+          </p:nvPr>
+        </p:nvSpPr>
+        <p:spPr/>
+        <p:txBody>
+          <a:bodyPr/>
+          <a:lstStyle/>
+          <a:p>
+            <a:r>
+              <a:rPr lang="en-US" dirty="0"/>
+              <a:t>We will build model M such that</a:t>
+            </a:r>
+          </a:p>
+          <a:p>
+            <a:pPr lvl="1"/>
+            <a:r>
+              <a:rPr lang="en-US" dirty="0"/>
+              <a:t>For variables x, y that are shared: M(x) = M(y) </a:t>
+            </a:r>
+            <a:r>
+              <a:rPr lang="en-US" dirty="0" err="1"/>
+              <a:t>iff</a:t>
+            </a:r>
+            <a:r>
+              <a:rPr lang="en-US" dirty="0"/>
+              <a:t> x ~ y</a:t>
+            </a:r>
+          </a:p>
+          <a:p>
+            <a:pPr lvl="1"/>
+            <a:r>
+              <a:rPr lang="en-US" dirty="0"/>
+              <a:t>M(s) = { M(x) | (set.in x s) ~ true } </a:t>
+            </a:r>
+          </a:p>
+          <a:p>
+            <a:pPr lvl="1"/>
+            <a:endParaRPr lang="en-US" dirty="0"/>
+          </a:p>
+          <a:p>
+            <a:r>
+              <a:rPr lang="en-US"/>
+              <a:t>Base Claim</a:t>
+            </a:r>
+            <a:r>
+              <a:rPr lang="en-US" dirty="0"/>
+              <a:t>: Saturation with respect to ~ and axioms for Base ensures this</a:t>
+            </a:r>
+          </a:p>
+          <a:p>
+            <a:pPr lvl="1"/>
+            <a:r>
+              <a:rPr lang="en-US" dirty="0"/>
+              <a:t>x ~ y, (set.in y (</a:t>
+            </a:r>
+            <a:r>
+              <a:rPr lang="en-US" dirty="0" err="1"/>
+              <a:t>set.union</a:t>
+            </a:r>
+            <a:r>
+              <a:rPr lang="en-US" dirty="0"/>
+              <a:t> s t)) is an atom then </a:t>
+            </a:r>
+            <a:br>
+              <a:rPr lang="en-US" dirty="0"/>
+            </a:br>
+            <a:br>
+              <a:rPr lang="en-US" dirty="0"/>
+            </a:br>
+            <a:r>
+              <a:rPr lang="en-US" dirty="0"/>
+              <a:t>(set.in x (</a:t>
+            </a:r>
+            <a:r>
+              <a:rPr lang="en-US" dirty="0" err="1"/>
+              <a:t>set.union</a:t>
+            </a:r>
+            <a:r>
+              <a:rPr lang="en-US" dirty="0"/>
+              <a:t> s t)) </a:t>
+            </a:r>
+            <a:r>
+              <a:rPr lang="en-US" dirty="0" err="1"/>
+              <a:t>iff</a:t>
+            </a:r>
+            <a:r>
+              <a:rPr lang="en-US" dirty="0"/>
+              <a:t> (or (set.in x s) (set.in x t))</a:t>
+            </a:r>
+          </a:p>
+          <a:p>
+            <a:pPr lvl="1"/>
+            <a:endParaRPr lang="en-US" dirty="0"/>
+          </a:p>
+          <a:p>
+            <a:pPr marL="457200" lvl="1" indent="0">
+              <a:buNone/>
+            </a:pPr>
+            <a:endParaRPr lang="en-US" dirty="0"/>
+          </a:p>
+        </p:txBody>
+      </p:sp>
+    </p:spTree>
+    <p:extLst>
+      <p:ext uri="{BB962C8B-B14F-4D97-AF65-F5344CB8AC3E}">
+        <p14:creationId xmlns:p14="http://schemas.microsoft.com/office/powerpoint/2010/main" val="3250766775"/>
+      </p:ext>
+    </p:extLst>
+  </p:cSld>
+  <p:clrMapOvr>
+    <a:masterClrMapping/>
+  </p:clrMapOvr>
+</p:sld>
+</file>
+
+<file path=ppt/slides/slide36.xml><?xml version="1.0" encoding="utf-8"?>
+<p:sld xmlns:a="http://schemas.openxmlformats.org/drawingml/2006/main" xmlns:r="http://schemas.openxmlformats.org/officeDocument/2006/relationships" xmlns:p="http://schemas.openxmlformats.org/presentationml/2006/main">
+  <p:cSld>
+    <p:spTree>
+      <p:nvGrpSpPr>
         <p:cNvPr id="1" name="">
           <a:extLst>
             <a:ext uri="{FF2B5EF4-FFF2-40B4-BE49-F238E27FC236}">
@@ -38858,7 +39032,7 @@
 </p:sld>
 </file>
 
-<file path=ppt/slides/slide36.xml><?xml version="1.0" encoding="utf-8"?>
+<file path=ppt/slides/slide37.xml><?xml version="1.0" encoding="utf-8"?>
 <p:sld xmlns:a="http://schemas.openxmlformats.org/drawingml/2006/main" xmlns:r="http://schemas.openxmlformats.org/officeDocument/2006/relationships" xmlns:p="http://schemas.openxmlformats.org/presentationml/2006/main">
   <p:cSld>
     <p:spTree>
@@ -38994,7 +39168,7 @@
 </p:sld>
 </file>
 
-<file path=ppt/slides/slide37.xml><?xml version="1.0" encoding="utf-8"?>
+<file path=ppt/slides/slide38.xml><?xml version="1.0" encoding="utf-8"?>
 <p:sld xmlns:a="http://schemas.openxmlformats.org/drawingml/2006/main" xmlns:r="http://schemas.openxmlformats.org/officeDocument/2006/relationships" xmlns:p="http://schemas.openxmlformats.org/presentationml/2006/main">
   <p:cSld>
     <p:spTree>
@@ -39347,7 +39521,7 @@
 </p:sld>
 </file>
 
-<file path=ppt/slides/slide38.xml><?xml version="1.0" encoding="utf-8"?>
+<file path=ppt/slides/slide39.xml><?xml version="1.0" encoding="utf-8"?>
 <p:sld xmlns:a="http://schemas.openxmlformats.org/drawingml/2006/main" xmlns:r="http://schemas.openxmlformats.org/officeDocument/2006/relationships" xmlns:p="http://schemas.openxmlformats.org/presentationml/2006/main">
   <p:cSld>
     <p:spTree>
@@ -39845,7 +40019,218 @@
 </p:sld>
 </file>
 
-<file path=ppt/slides/slide39.xml><?xml version="1.0" encoding="utf-8"?>
+<file path=ppt/slides/slide4.xml><?xml version="1.0" encoding="utf-8"?>
+<p:sld xmlns:a="http://schemas.openxmlformats.org/drawingml/2006/main" xmlns:r="http://schemas.openxmlformats.org/officeDocument/2006/relationships" xmlns:p="http://schemas.openxmlformats.org/presentationml/2006/main">
+  <p:cSld>
+    <p:spTree>
+      <p:nvGrpSpPr>
+        <p:cNvPr id="1" name=""/>
+        <p:cNvGrpSpPr/>
+        <p:nvPr/>
+      </p:nvGrpSpPr>
+      <p:grpSpPr>
+        <a:xfrm>
+          <a:off x="0" y="0"/>
+          <a:ext cx="0" cy="0"/>
+          <a:chOff x="0" y="0"/>
+          <a:chExt cx="0" cy="0"/>
+        </a:xfrm>
+      </p:grpSpPr>
+      <p:pic>
+        <p:nvPicPr>
+          <p:cNvPr id="4" name="Picture 3" descr="Diagram&#10;&#10;Description automatically generated">
+            <a:extLst>
+              <a:ext uri="{FF2B5EF4-FFF2-40B4-BE49-F238E27FC236}">
+                <a16:creationId xmlns:a16="http://schemas.microsoft.com/office/drawing/2014/main" id="{1A0C7838-519E-4C7C-BF74-624B75044D00}"/>
+              </a:ext>
+            </a:extLst>
+          </p:cNvPr>
+          <p:cNvPicPr>
+            <a:picLocks noChangeAspect="1"/>
+          </p:cNvPicPr>
+          <p:nvPr/>
+        </p:nvPicPr>
+        <p:blipFill>
+          <a:blip r:embed="rId2">
+            <a:extLst>
+              <a:ext uri="{28A0092B-C50C-407E-A947-70E740481C1C}">
+                <a14:useLocalDpi xmlns:a14="http://schemas.microsoft.com/office/drawing/2010/main" val="0"/>
+              </a:ext>
+            </a:extLst>
+          </a:blip>
+          <a:stretch>
+            <a:fillRect/>
+          </a:stretch>
+        </p:blipFill>
+        <p:spPr>
+          <a:xfrm>
+            <a:off x="4540571" y="292410"/>
+            <a:ext cx="6305549" cy="6394360"/>
+          </a:xfrm>
+          <a:prstGeom prst="rect">
+            <a:avLst/>
+          </a:prstGeom>
+        </p:spPr>
+      </p:pic>
+      <p:sp>
+        <p:nvSpPr>
+          <p:cNvPr id="7" name="TextBox 6">
+            <a:extLst>
+              <a:ext uri="{FF2B5EF4-FFF2-40B4-BE49-F238E27FC236}">
+                <a16:creationId xmlns:a16="http://schemas.microsoft.com/office/drawing/2014/main" id="{9773374F-F846-442A-8F5F-6012787369D2}"/>
+              </a:ext>
+            </a:extLst>
+          </p:cNvPr>
+          <p:cNvSpPr txBox="1"/>
+          <p:nvPr/>
+        </p:nvSpPr>
+        <p:spPr>
+          <a:xfrm>
+            <a:off x="7600950" y="4086225"/>
+            <a:ext cx="92396" cy="369330"/>
+          </a:xfrm>
+          <a:prstGeom prst="rect">
+            <a:avLst/>
+          </a:prstGeom>
+          <a:noFill/>
+          <a:ln w="12700" cap="flat">
+            <a:noFill/>
+            <a:miter lim="400000"/>
+          </a:ln>
+          <a:effectLst/>
+          <a:sp3d/>
+        </p:spPr>
+        <p:style>
+          <a:lnRef idx="0">
+            <a:scrgbClr r="0" g="0" b="0"/>
+          </a:lnRef>
+          <a:fillRef idx="0">
+            <a:scrgbClr r="0" g="0" b="0"/>
+          </a:fillRef>
+          <a:effectRef idx="0">
+            <a:scrgbClr r="0" g="0" b="0"/>
+          </a:effectRef>
+          <a:fontRef idx="none"/>
+        </p:style>
+        <p:txBody>
+          <a:bodyPr rot="0" spcFirstLastPara="1" vertOverflow="overflow" horzOverflow="overflow" vert="horz" wrap="none" lIns="45719" tIns="45719" rIns="45719" bIns="45719" numCol="1" spcCol="38100" rtlCol="0" anchor="t">
+            <a:spAutoFit/>
+          </a:bodyPr>
+          <a:lstStyle/>
+          <a:p>
+            <a:pPr marL="0" marR="0" indent="0" algn="l" defTabSz="914400" rtl="0" fontAlgn="auto" latinLnBrk="0" hangingPunct="0">
+              <a:lnSpc>
+                <a:spcPct val="100000"/>
+              </a:lnSpc>
+              <a:spcBef>
+                <a:spcPts val="0"/>
+              </a:spcBef>
+              <a:spcAft>
+                <a:spcPts val="0"/>
+              </a:spcAft>
+              <a:buClrTx/>
+              <a:buSzTx/>
+              <a:buFontTx/>
+              <a:buNone/>
+              <a:tabLst/>
+            </a:pPr>
+            <a:endParaRPr kumimoji="0" lang="en-US" sz="1800" b="0" i="0" u="none" strike="noStrike" cap="none" spc="0" normalizeH="0" baseline="0">
+              <a:ln>
+                <a:noFill/>
+              </a:ln>
+              <a:solidFill>
+                <a:srgbClr val="000000"/>
+              </a:solidFill>
+              <a:effectLst/>
+              <a:uFillTx/>
+              <a:latin typeface="+mj-lt"/>
+              <a:ea typeface="+mj-ea"/>
+              <a:cs typeface="+mj-cs"/>
+              <a:sym typeface="Calibri"/>
+            </a:endParaRPr>
+          </a:p>
+        </p:txBody>
+      </p:sp>
+      <p:sp>
+        <p:nvSpPr>
+          <p:cNvPr id="9" name="Title 1">
+            <a:extLst>
+              <a:ext uri="{FF2B5EF4-FFF2-40B4-BE49-F238E27FC236}">
+                <a16:creationId xmlns:a16="http://schemas.microsoft.com/office/drawing/2014/main" id="{9A8335DA-ADE9-40DF-B65B-B458D0767C7A}"/>
+              </a:ext>
+            </a:extLst>
+          </p:cNvPr>
+          <p:cNvSpPr>
+            <a:spLocks noGrp="1"/>
+          </p:cNvSpPr>
+          <p:nvPr>
+            <p:ph type="title"/>
+          </p:nvPr>
+        </p:nvSpPr>
+        <p:spPr>
+          <a:xfrm>
+            <a:off x="838200" y="365125"/>
+            <a:ext cx="10515600" cy="1325563"/>
+          </a:xfrm>
+        </p:spPr>
+        <p:txBody>
+          <a:bodyPr/>
+          <a:lstStyle/>
+          <a:p>
+            <a:r>
+              <a:rPr lang="en-US"/>
+              <a:t>        overview</a:t>
+            </a:r>
+          </a:p>
+        </p:txBody>
+      </p:sp>
+      <p:pic>
+        <p:nvPicPr>
+          <p:cNvPr id="10" name="Picture 2" descr="Picture 2">
+            <a:extLst>
+              <a:ext uri="{FF2B5EF4-FFF2-40B4-BE49-F238E27FC236}">
+                <a16:creationId xmlns:a16="http://schemas.microsoft.com/office/drawing/2014/main" id="{B50BA9FD-C68B-49D1-AE57-7ADC77BC2B39}"/>
+              </a:ext>
+            </a:extLst>
+          </p:cNvPr>
+          <p:cNvPicPr>
+            <a:picLocks noChangeAspect="1"/>
+          </p:cNvPicPr>
+          <p:nvPr/>
+        </p:nvPicPr>
+        <p:blipFill>
+          <a:blip r:embed="rId3"/>
+          <a:stretch>
+            <a:fillRect/>
+          </a:stretch>
+        </p:blipFill>
+        <p:spPr>
+          <a:xfrm>
+            <a:off x="972364" y="795173"/>
+            <a:ext cx="769890" cy="465465"/>
+          </a:xfrm>
+          <a:prstGeom prst="rect">
+            <a:avLst/>
+          </a:prstGeom>
+          <a:ln w="12700">
+            <a:miter lim="400000"/>
+          </a:ln>
+        </p:spPr>
+      </p:pic>
+    </p:spTree>
+    <p:extLst>
+      <p:ext uri="{BB962C8B-B14F-4D97-AF65-F5344CB8AC3E}">
+        <p14:creationId xmlns:p14="http://schemas.microsoft.com/office/powerpoint/2010/main" val="3758175032"/>
+      </p:ext>
+    </p:extLst>
+  </p:cSld>
+  <p:clrMapOvr>
+    <a:masterClrMapping/>
+  </p:clrMapOvr>
+</p:sld>
+</file>
+
+<file path=ppt/slides/slide40.xml><?xml version="1.0" encoding="utf-8"?>
 <p:sld xmlns:a="http://schemas.openxmlformats.org/drawingml/2006/main" xmlns:r="http://schemas.openxmlformats.org/officeDocument/2006/relationships" xmlns:p="http://schemas.openxmlformats.org/presentationml/2006/main">
   <p:cSld>
     <p:spTree>
@@ -40132,218 +40517,7 @@
 </p:sld>
 </file>
 
-<file path=ppt/slides/slide4.xml><?xml version="1.0" encoding="utf-8"?>
-<p:sld xmlns:a="http://schemas.openxmlformats.org/drawingml/2006/main" xmlns:r="http://schemas.openxmlformats.org/officeDocument/2006/relationships" xmlns:p="http://schemas.openxmlformats.org/presentationml/2006/main">
-  <p:cSld>
-    <p:spTree>
-      <p:nvGrpSpPr>
-        <p:cNvPr id="1" name=""/>
-        <p:cNvGrpSpPr/>
-        <p:nvPr/>
-      </p:nvGrpSpPr>
-      <p:grpSpPr>
-        <a:xfrm>
-          <a:off x="0" y="0"/>
-          <a:ext cx="0" cy="0"/>
-          <a:chOff x="0" y="0"/>
-          <a:chExt cx="0" cy="0"/>
-        </a:xfrm>
-      </p:grpSpPr>
-      <p:pic>
-        <p:nvPicPr>
-          <p:cNvPr id="4" name="Picture 3" descr="Diagram&#10;&#10;Description automatically generated">
-            <a:extLst>
-              <a:ext uri="{FF2B5EF4-FFF2-40B4-BE49-F238E27FC236}">
-                <a16:creationId xmlns:a16="http://schemas.microsoft.com/office/drawing/2014/main" id="{1A0C7838-519E-4C7C-BF74-624B75044D00}"/>
-              </a:ext>
-            </a:extLst>
-          </p:cNvPr>
-          <p:cNvPicPr>
-            <a:picLocks noChangeAspect="1"/>
-          </p:cNvPicPr>
-          <p:nvPr/>
-        </p:nvPicPr>
-        <p:blipFill>
-          <a:blip r:embed="rId2">
-            <a:extLst>
-              <a:ext uri="{28A0092B-C50C-407E-A947-70E740481C1C}">
-                <a14:useLocalDpi xmlns:a14="http://schemas.microsoft.com/office/drawing/2010/main" val="0"/>
-              </a:ext>
-            </a:extLst>
-          </a:blip>
-          <a:stretch>
-            <a:fillRect/>
-          </a:stretch>
-        </p:blipFill>
-        <p:spPr>
-          <a:xfrm>
-            <a:off x="4540571" y="292410"/>
-            <a:ext cx="6305549" cy="6394360"/>
-          </a:xfrm>
-          <a:prstGeom prst="rect">
-            <a:avLst/>
-          </a:prstGeom>
-        </p:spPr>
-      </p:pic>
-      <p:sp>
-        <p:nvSpPr>
-          <p:cNvPr id="7" name="TextBox 6">
-            <a:extLst>
-              <a:ext uri="{FF2B5EF4-FFF2-40B4-BE49-F238E27FC236}">
-                <a16:creationId xmlns:a16="http://schemas.microsoft.com/office/drawing/2014/main" id="{9773374F-F846-442A-8F5F-6012787369D2}"/>
-              </a:ext>
-            </a:extLst>
-          </p:cNvPr>
-          <p:cNvSpPr txBox="1"/>
-          <p:nvPr/>
-        </p:nvSpPr>
-        <p:spPr>
-          <a:xfrm>
-            <a:off x="7600950" y="4086225"/>
-            <a:ext cx="92396" cy="369330"/>
-          </a:xfrm>
-          <a:prstGeom prst="rect">
-            <a:avLst/>
-          </a:prstGeom>
-          <a:noFill/>
-          <a:ln w="12700" cap="flat">
-            <a:noFill/>
-            <a:miter lim="400000"/>
-          </a:ln>
-          <a:effectLst/>
-          <a:sp3d/>
-        </p:spPr>
-        <p:style>
-          <a:lnRef idx="0">
-            <a:scrgbClr r="0" g="0" b="0"/>
-          </a:lnRef>
-          <a:fillRef idx="0">
-            <a:scrgbClr r="0" g="0" b="0"/>
-          </a:fillRef>
-          <a:effectRef idx="0">
-            <a:scrgbClr r="0" g="0" b="0"/>
-          </a:effectRef>
-          <a:fontRef idx="none"/>
-        </p:style>
-        <p:txBody>
-          <a:bodyPr rot="0" spcFirstLastPara="1" vertOverflow="overflow" horzOverflow="overflow" vert="horz" wrap="none" lIns="45719" tIns="45719" rIns="45719" bIns="45719" numCol="1" spcCol="38100" rtlCol="0" anchor="t">
-            <a:spAutoFit/>
-          </a:bodyPr>
-          <a:lstStyle/>
-          <a:p>
-            <a:pPr marL="0" marR="0" indent="0" algn="l" defTabSz="914400" rtl="0" fontAlgn="auto" latinLnBrk="0" hangingPunct="0">
-              <a:lnSpc>
-                <a:spcPct val="100000"/>
-              </a:lnSpc>
-              <a:spcBef>
-                <a:spcPts val="0"/>
-              </a:spcBef>
-              <a:spcAft>
-                <a:spcPts val="0"/>
-              </a:spcAft>
-              <a:buClrTx/>
-              <a:buSzTx/>
-              <a:buFontTx/>
-              <a:buNone/>
-              <a:tabLst/>
-            </a:pPr>
-            <a:endParaRPr kumimoji="0" lang="en-US" sz="1800" b="0" i="0" u="none" strike="noStrike" cap="none" spc="0" normalizeH="0" baseline="0">
-              <a:ln>
-                <a:noFill/>
-              </a:ln>
-              <a:solidFill>
-                <a:srgbClr val="000000"/>
-              </a:solidFill>
-              <a:effectLst/>
-              <a:uFillTx/>
-              <a:latin typeface="+mj-lt"/>
-              <a:ea typeface="+mj-ea"/>
-              <a:cs typeface="+mj-cs"/>
-              <a:sym typeface="Calibri"/>
-            </a:endParaRPr>
-          </a:p>
-        </p:txBody>
-      </p:sp>
-      <p:sp>
-        <p:nvSpPr>
-          <p:cNvPr id="9" name="Title 1">
-            <a:extLst>
-              <a:ext uri="{FF2B5EF4-FFF2-40B4-BE49-F238E27FC236}">
-                <a16:creationId xmlns:a16="http://schemas.microsoft.com/office/drawing/2014/main" id="{9A8335DA-ADE9-40DF-B65B-B458D0767C7A}"/>
-              </a:ext>
-            </a:extLst>
-          </p:cNvPr>
-          <p:cNvSpPr>
-            <a:spLocks noGrp="1"/>
-          </p:cNvSpPr>
-          <p:nvPr>
-            <p:ph type="title"/>
-          </p:nvPr>
-        </p:nvSpPr>
-        <p:spPr>
-          <a:xfrm>
-            <a:off x="838200" y="365125"/>
-            <a:ext cx="10515600" cy="1325563"/>
-          </a:xfrm>
-        </p:spPr>
-        <p:txBody>
-          <a:bodyPr/>
-          <a:lstStyle/>
-          <a:p>
-            <a:r>
-              <a:rPr lang="en-US"/>
-              <a:t>        overview</a:t>
-            </a:r>
-          </a:p>
-        </p:txBody>
-      </p:sp>
-      <p:pic>
-        <p:nvPicPr>
-          <p:cNvPr id="10" name="Picture 2" descr="Picture 2">
-            <a:extLst>
-              <a:ext uri="{FF2B5EF4-FFF2-40B4-BE49-F238E27FC236}">
-                <a16:creationId xmlns:a16="http://schemas.microsoft.com/office/drawing/2014/main" id="{B50BA9FD-C68B-49D1-AE57-7ADC77BC2B39}"/>
-              </a:ext>
-            </a:extLst>
-          </p:cNvPr>
-          <p:cNvPicPr>
-            <a:picLocks noChangeAspect="1"/>
-          </p:cNvPicPr>
-          <p:nvPr/>
-        </p:nvPicPr>
-        <p:blipFill>
-          <a:blip r:embed="rId3"/>
-          <a:stretch>
-            <a:fillRect/>
-          </a:stretch>
-        </p:blipFill>
-        <p:spPr>
-          <a:xfrm>
-            <a:off x="972364" y="795173"/>
-            <a:ext cx="769890" cy="465465"/>
-          </a:xfrm>
-          <a:prstGeom prst="rect">
-            <a:avLst/>
-          </a:prstGeom>
-          <a:ln w="12700">
-            <a:miter lim="400000"/>
-          </a:ln>
-        </p:spPr>
-      </p:pic>
-    </p:spTree>
-    <p:extLst>
-      <p:ext uri="{BB962C8B-B14F-4D97-AF65-F5344CB8AC3E}">
-        <p14:creationId xmlns:p14="http://schemas.microsoft.com/office/powerpoint/2010/main" val="3758175032"/>
-      </p:ext>
-    </p:extLst>
-  </p:cSld>
-  <p:clrMapOvr>
-    <a:masterClrMapping/>
-  </p:clrMapOvr>
-</p:sld>
-</file>
-
-<file path=ppt/slides/slide40.xml><?xml version="1.0" encoding="utf-8"?>
+<file path=ppt/slides/slide41.xml><?xml version="1.0" encoding="utf-8"?>
 <p:sld xmlns:a="http://schemas.openxmlformats.org/drawingml/2006/main" xmlns:r="http://schemas.openxmlformats.org/officeDocument/2006/relationships" xmlns:p="http://schemas.openxmlformats.org/presentationml/2006/main">
   <p:cSld>
     <p:spTree>
@@ -42372,6 +42546,12 @@
 </file>
 
 <file path=customXml/item1.xml><?xml version="1.0" encoding="utf-8"?>
+<p:properties xmlns:p="http://schemas.microsoft.com/office/2006/metadata/properties" xmlns:xsi="http://www.w3.org/2001/XMLSchema-instance" xmlns:pc="http://schemas.microsoft.com/office/infopath/2007/PartnerControls">
+  <documentManagement/>
+</p:properties>
+</file>
+
+<file path=customXml/item2.xml><?xml version="1.0" encoding="utf-8"?>
 <ct:contentTypeSchema xmlns:ct="http://schemas.microsoft.com/office/2006/metadata/contentType" xmlns:ma="http://schemas.microsoft.com/office/2006/metadata/properties/metaAttributes" ct:_="" ma:_="" ma:contentTypeName="Document" ma:contentTypeID="0x01010097FD63E395080A43A32F443B5DB3CA82" ma:contentTypeVersion="15" ma:contentTypeDescription="Create a new document." ma:contentTypeScope="" ma:versionID="a3e21556ad7696f46e6aeed3e8446d09">
   <xsd:schema xmlns:xsd="http://www.w3.org/2001/XMLSchema" xmlns:xs="http://www.w3.org/2001/XMLSchema" xmlns:p="http://schemas.microsoft.com/office/2006/metadata/properties" xmlns:ns3="1eac365c-24b9-49f6-8b08-64a95c9e0c2d" xmlns:ns4="a2be3752-dc5b-4cdd-a620-72e6c83e257b" targetNamespace="http://schemas.microsoft.com/office/2006/metadata/properties" ma:root="true" ma:fieldsID="4546fefd2005ff12357c2bd0a43b79fc" ns3:_="" ns4:_="">
     <xsd:import namespace="1eac365c-24b9-49f6-8b08-64a95c9e0c2d"/>
@@ -42608,7 +42788,7 @@
 </ct:contentTypeSchema>
 </file>
 
-<file path=customXml/item2.xml><?xml version="1.0" encoding="utf-8"?>
+<file path=customXml/item3.xml><?xml version="1.0" encoding="utf-8"?>
 <?mso-contentType ?>
 <FormTemplates xmlns="http://schemas.microsoft.com/sharepoint/v3/contenttype/forms">
   <Display>DocumentLibraryForm</Display>
@@ -42617,13 +42797,24 @@
 </FormTemplates>
 </file>
 
-<file path=customXml/item3.xml><?xml version="1.0" encoding="utf-8"?>
-<p:properties xmlns:p="http://schemas.microsoft.com/office/2006/metadata/properties" xmlns:xsi="http://www.w3.org/2001/XMLSchema-instance" xmlns:pc="http://schemas.microsoft.com/office/infopath/2007/PartnerControls">
-  <documentManagement/>
-</p:properties>
+<file path=customXml/itemProps1.xml><?xml version="1.0" encoding="utf-8"?>
+<ds:datastoreItem xmlns:ds="http://schemas.openxmlformats.org/officeDocument/2006/customXml" ds:itemID="{3DA4B80E-AB13-4EE9-A8E3-2ACC6F11AFAD}">
+  <ds:schemaRefs>
+    <ds:schemaRef ds:uri="http://schemas.openxmlformats.org/package/2006/metadata/core-properties"/>
+    <ds:schemaRef ds:uri="http://schemas.microsoft.com/office/infopath/2007/PartnerControls"/>
+    <ds:schemaRef ds:uri="http://schemas.microsoft.com/office/2006/documentManagement/types"/>
+    <ds:schemaRef ds:uri="http://www.w3.org/XML/1998/namespace"/>
+    <ds:schemaRef ds:uri="http://purl.org/dc/elements/1.1/"/>
+    <ds:schemaRef ds:uri="a2be3752-dc5b-4cdd-a620-72e6c83e257b"/>
+    <ds:schemaRef ds:uri="http://purl.org/dc/dcmitype/"/>
+    <ds:schemaRef ds:uri="1eac365c-24b9-49f6-8b08-64a95c9e0c2d"/>
+    <ds:schemaRef ds:uri="http://purl.org/dc/terms/"/>
+    <ds:schemaRef ds:uri="http://schemas.microsoft.com/office/2006/metadata/properties"/>
+  </ds:schemaRefs>
+</ds:datastoreItem>
 </file>
 
-<file path=customXml/itemProps1.xml><?xml version="1.0" encoding="utf-8"?>
+<file path=customXml/itemProps2.xml><?xml version="1.0" encoding="utf-8"?>
 <ds:datastoreItem xmlns:ds="http://schemas.openxmlformats.org/officeDocument/2006/customXml" ds:itemID="{AF506A69-CB65-41D0-9E76-2210A713824C}">
   <ds:schemaRefs>
     <ds:schemaRef ds:uri="1eac365c-24b9-49f6-8b08-64a95c9e0c2d"/>
@@ -42642,27 +42833,10 @@
 </ds:datastoreItem>
 </file>
 
-<file path=customXml/itemProps2.xml><?xml version="1.0" encoding="utf-8"?>
+<file path=customXml/itemProps3.xml><?xml version="1.0" encoding="utf-8"?>
 <ds:datastoreItem xmlns:ds="http://schemas.openxmlformats.org/officeDocument/2006/customXml" ds:itemID="{B5E21315-3456-4FBC-8807-B24E962756AF}">
   <ds:schemaRefs>
     <ds:schemaRef ds:uri="http://schemas.microsoft.com/sharepoint/v3/contenttype/forms"/>
-  </ds:schemaRefs>
-</ds:datastoreItem>
-</file>
-
-<file path=customXml/itemProps3.xml><?xml version="1.0" encoding="utf-8"?>
-<ds:datastoreItem xmlns:ds="http://schemas.openxmlformats.org/officeDocument/2006/customXml" ds:itemID="{3DA4B80E-AB13-4EE9-A8E3-2ACC6F11AFAD}">
-  <ds:schemaRefs>
-    <ds:schemaRef ds:uri="http://schemas.openxmlformats.org/package/2006/metadata/core-properties"/>
-    <ds:schemaRef ds:uri="http://schemas.microsoft.com/office/infopath/2007/PartnerControls"/>
-    <ds:schemaRef ds:uri="http://schemas.microsoft.com/office/2006/documentManagement/types"/>
-    <ds:schemaRef ds:uri="http://www.w3.org/XML/1998/namespace"/>
-    <ds:schemaRef ds:uri="http://purl.org/dc/elements/1.1/"/>
-    <ds:schemaRef ds:uri="a2be3752-dc5b-4cdd-a620-72e6c83e257b"/>
-    <ds:schemaRef ds:uri="http://purl.org/dc/dcmitype/"/>
-    <ds:schemaRef ds:uri="1eac365c-24b9-49f6-8b08-64a95c9e0c2d"/>
-    <ds:schemaRef ds:uri="http://purl.org/dc/terms/"/>
-    <ds:schemaRef ds:uri="http://schemas.microsoft.com/office/2006/metadata/properties"/>
   </ds:schemaRefs>
 </ds:datastoreItem>
 </file>

</xml_diff>